<commit_message>
fix color in image
Signed-off-by: jetzlstorfer <juergen.etzlstorfer@dynatrace.com>
</commit_message>
<xml_diff>
--- a/content/docs/0.8.x/integrations/how_integrate/assets/integration_concepts.pptx
+++ b/content/docs/0.8.x/integrations/how_integrate/assets/integration_concepts.pptx
@@ -273,7 +273,7 @@
           <a:p>
             <a:fld id="{5614F2D6-720D-C247-ABDA-43D51A7EF99E}" type="datetimeFigureOut">
               <a:rPr lang="en-AT" smtClean="0"/>
-              <a:t>05.08.21</a:t>
+              <a:t>06.08.21</a:t>
             </a:fld>
             <a:endParaRPr lang="en-AT"/>
           </a:p>
@@ -473,7 +473,7 @@
           <a:p>
             <a:fld id="{5614F2D6-720D-C247-ABDA-43D51A7EF99E}" type="datetimeFigureOut">
               <a:rPr lang="en-AT" smtClean="0"/>
-              <a:t>05.08.21</a:t>
+              <a:t>06.08.21</a:t>
             </a:fld>
             <a:endParaRPr lang="en-AT"/>
           </a:p>
@@ -683,7 +683,7 @@
           <a:p>
             <a:fld id="{5614F2D6-720D-C247-ABDA-43D51A7EF99E}" type="datetimeFigureOut">
               <a:rPr lang="en-AT" smtClean="0"/>
-              <a:t>05.08.21</a:t>
+              <a:t>06.08.21</a:t>
             </a:fld>
             <a:endParaRPr lang="en-AT"/>
           </a:p>
@@ -883,7 +883,7 @@
           <a:p>
             <a:fld id="{5614F2D6-720D-C247-ABDA-43D51A7EF99E}" type="datetimeFigureOut">
               <a:rPr lang="en-AT" smtClean="0"/>
-              <a:t>05.08.21</a:t>
+              <a:t>06.08.21</a:t>
             </a:fld>
             <a:endParaRPr lang="en-AT"/>
           </a:p>
@@ -1159,7 +1159,7 @@
           <a:p>
             <a:fld id="{5614F2D6-720D-C247-ABDA-43D51A7EF99E}" type="datetimeFigureOut">
               <a:rPr lang="en-AT" smtClean="0"/>
-              <a:t>05.08.21</a:t>
+              <a:t>06.08.21</a:t>
             </a:fld>
             <a:endParaRPr lang="en-AT"/>
           </a:p>
@@ -1427,7 +1427,7 @@
           <a:p>
             <a:fld id="{5614F2D6-720D-C247-ABDA-43D51A7EF99E}" type="datetimeFigureOut">
               <a:rPr lang="en-AT" smtClean="0"/>
-              <a:t>05.08.21</a:t>
+              <a:t>06.08.21</a:t>
             </a:fld>
             <a:endParaRPr lang="en-AT"/>
           </a:p>
@@ -1842,7 +1842,7 @@
           <a:p>
             <a:fld id="{5614F2D6-720D-C247-ABDA-43D51A7EF99E}" type="datetimeFigureOut">
               <a:rPr lang="en-AT" smtClean="0"/>
-              <a:t>05.08.21</a:t>
+              <a:t>06.08.21</a:t>
             </a:fld>
             <a:endParaRPr lang="en-AT"/>
           </a:p>
@@ -1984,7 +1984,7 @@
           <a:p>
             <a:fld id="{5614F2D6-720D-C247-ABDA-43D51A7EF99E}" type="datetimeFigureOut">
               <a:rPr lang="en-AT" smtClean="0"/>
-              <a:t>05.08.21</a:t>
+              <a:t>06.08.21</a:t>
             </a:fld>
             <a:endParaRPr lang="en-AT"/>
           </a:p>
@@ -2097,7 +2097,7 @@
           <a:p>
             <a:fld id="{5614F2D6-720D-C247-ABDA-43D51A7EF99E}" type="datetimeFigureOut">
               <a:rPr lang="en-AT" smtClean="0"/>
-              <a:t>05.08.21</a:t>
+              <a:t>06.08.21</a:t>
             </a:fld>
             <a:endParaRPr lang="en-AT"/>
           </a:p>
@@ -2410,7 +2410,7 @@
           <a:p>
             <a:fld id="{5614F2D6-720D-C247-ABDA-43D51A7EF99E}" type="datetimeFigureOut">
               <a:rPr lang="en-AT" smtClean="0"/>
-              <a:t>05.08.21</a:t>
+              <a:t>06.08.21</a:t>
             </a:fld>
             <a:endParaRPr lang="en-AT"/>
           </a:p>
@@ -2699,7 +2699,7 @@
           <a:p>
             <a:fld id="{5614F2D6-720D-C247-ABDA-43D51A7EF99E}" type="datetimeFigureOut">
               <a:rPr lang="en-AT" smtClean="0"/>
-              <a:t>05.08.21</a:t>
+              <a:t>06.08.21</a:t>
             </a:fld>
             <a:endParaRPr lang="en-AT"/>
           </a:p>
@@ -2942,7 +2942,7 @@
           <a:p>
             <a:fld id="{5614F2D6-720D-C247-ABDA-43D51A7EF99E}" type="datetimeFigureOut">
               <a:rPr lang="en-AT" smtClean="0"/>
-              <a:t>05.08.21</a:t>
+              <a:t>06.08.21</a:t>
             </a:fld>
             <a:endParaRPr lang="en-AT"/>
           </a:p>
@@ -3380,9 +3380,7 @@
             <a:avLst/>
           </a:prstGeom>
           <a:solidFill>
-            <a:srgbClr val="4472C4">
-              <a:lumMod val="50000"/>
-            </a:srgbClr>
+            <a:srgbClr val="005593"/>
           </a:solidFill>
           <a:ln w="47625" cap="flat" cmpd="sng" algn="ctr">
             <a:noFill/>
@@ -3454,7 +3452,7 @@
           <a:noFill/>
           <a:ln w="31750" cap="flat" cmpd="sng" algn="ctr">
             <a:solidFill>
-              <a:srgbClr val="4472C4"/>
+              <a:srgbClr val="005593"/>
             </a:solidFill>
             <a:prstDash val="solid"/>
             <a:miter lim="800000"/>
@@ -3743,10 +3741,12 @@
             <a:avLst/>
           </a:prstGeom>
           <a:solidFill>
-            <a:srgbClr val="4472C4"/>
+            <a:srgbClr val="005593"/>
           </a:solidFill>
           <a:ln w="12700" cap="flat" cmpd="sng" algn="ctr">
-            <a:noFill/>
+            <a:solidFill>
+              <a:srgbClr val="005593"/>
+            </a:solidFill>
             <a:prstDash val="solid"/>
             <a:miter lim="800000"/>
           </a:ln>
@@ -3829,7 +3829,7 @@
           <a:noFill/>
           <a:ln w="31750" cap="flat" cmpd="sng" algn="ctr">
             <a:solidFill>
-              <a:srgbClr val="4472C4"/>
+              <a:srgbClr val="005593"/>
             </a:solidFill>
             <a:prstDash val="solid"/>
             <a:miter lim="800000"/>
@@ -3852,7 +3852,7 @@
         </p:nvSpPr>
         <p:spPr>
           <a:xfrm>
-            <a:off x="3729224" y="2367233"/>
+            <a:off x="3794537" y="2367233"/>
             <a:ext cx="1114247" cy="646331"/>
           </a:xfrm>
           <a:prstGeom prst="rect">
@@ -3904,10 +3904,12 @@
             <a:avLst/>
           </a:prstGeom>
           <a:solidFill>
-            <a:srgbClr val="4472C4"/>
+            <a:srgbClr val="005593"/>
           </a:solidFill>
           <a:ln w="12700" cap="flat" cmpd="sng" algn="ctr">
-            <a:noFill/>
+            <a:solidFill>
+              <a:srgbClr val="005593"/>
+            </a:solidFill>
             <a:prstDash val="solid"/>
             <a:miter lim="800000"/>
           </a:ln>
@@ -4025,10 +4027,12 @@
             <a:avLst/>
           </a:prstGeom>
           <a:solidFill>
-            <a:srgbClr val="4472C4"/>
+            <a:srgbClr val="005593"/>
           </a:solidFill>
           <a:ln w="12700" cap="flat" cmpd="sng" algn="ctr">
-            <a:noFill/>
+            <a:solidFill>
+              <a:srgbClr val="005593"/>
+            </a:solidFill>
             <a:prstDash val="solid"/>
             <a:miter lim="800000"/>
           </a:ln>
@@ -4105,7 +4109,7 @@
           <a:noFill/>
           <a:ln w="31750" cap="flat" cmpd="sng" algn="ctr">
             <a:solidFill>
-              <a:srgbClr val="4472C4"/>
+              <a:srgbClr val="005593"/>
             </a:solidFill>
             <a:prstDash val="solid"/>
             <a:miter lim="800000"/>
@@ -4180,10 +4184,12 @@
             <a:avLst/>
           </a:prstGeom>
           <a:solidFill>
-            <a:srgbClr val="4472C4"/>
+            <a:srgbClr val="005593"/>
           </a:solidFill>
           <a:ln w="12700" cap="flat" cmpd="sng" algn="ctr">
-            <a:noFill/>
+            <a:solidFill>
+              <a:srgbClr val="005593"/>
+            </a:solidFill>
             <a:prstDash val="solid"/>
             <a:miter lim="800000"/>
           </a:ln>
@@ -4260,7 +4266,7 @@
           <a:noFill/>
           <a:ln w="31750" cap="flat" cmpd="sng" algn="ctr">
             <a:solidFill>
-              <a:srgbClr val="4472C4"/>
+              <a:srgbClr val="005593"/>
             </a:solidFill>
             <a:prstDash val="solid"/>
             <a:miter lim="800000"/>
@@ -4290,9 +4296,7 @@
             <a:avLst/>
           </a:prstGeom>
           <a:solidFill>
-            <a:srgbClr val="4472C4">
-              <a:lumMod val="50000"/>
-            </a:srgbClr>
+            <a:srgbClr val="005593"/>
           </a:solidFill>
           <a:ln w="47625" cap="flat" cmpd="sng" algn="ctr">
             <a:noFill/>

</xml_diff>

<commit_message>
fix color in image (#894)
* fix color in image

Signed-off-by: jetzlstorfer <juergen.etzlstorfer@dynatrace.com>

* fix color in image

Signed-off-by: jetzlstorfer <juergen.etzlstorfer@dynatrace.com>
</commit_message>
<xml_diff>
--- a/content/docs/0.8.x/integrations/how_integrate/assets/integration_concepts.pptx
+++ b/content/docs/0.8.x/integrations/how_integrate/assets/integration_concepts.pptx
@@ -273,7 +273,7 @@
           <a:p>
             <a:fld id="{5614F2D6-720D-C247-ABDA-43D51A7EF99E}" type="datetimeFigureOut">
               <a:rPr lang="en-AT" smtClean="0"/>
-              <a:t>05.08.21</a:t>
+              <a:t>06.08.21</a:t>
             </a:fld>
             <a:endParaRPr lang="en-AT"/>
           </a:p>
@@ -473,7 +473,7 @@
           <a:p>
             <a:fld id="{5614F2D6-720D-C247-ABDA-43D51A7EF99E}" type="datetimeFigureOut">
               <a:rPr lang="en-AT" smtClean="0"/>
-              <a:t>05.08.21</a:t>
+              <a:t>06.08.21</a:t>
             </a:fld>
             <a:endParaRPr lang="en-AT"/>
           </a:p>
@@ -683,7 +683,7 @@
           <a:p>
             <a:fld id="{5614F2D6-720D-C247-ABDA-43D51A7EF99E}" type="datetimeFigureOut">
               <a:rPr lang="en-AT" smtClean="0"/>
-              <a:t>05.08.21</a:t>
+              <a:t>06.08.21</a:t>
             </a:fld>
             <a:endParaRPr lang="en-AT"/>
           </a:p>
@@ -883,7 +883,7 @@
           <a:p>
             <a:fld id="{5614F2D6-720D-C247-ABDA-43D51A7EF99E}" type="datetimeFigureOut">
               <a:rPr lang="en-AT" smtClean="0"/>
-              <a:t>05.08.21</a:t>
+              <a:t>06.08.21</a:t>
             </a:fld>
             <a:endParaRPr lang="en-AT"/>
           </a:p>
@@ -1159,7 +1159,7 @@
           <a:p>
             <a:fld id="{5614F2D6-720D-C247-ABDA-43D51A7EF99E}" type="datetimeFigureOut">
               <a:rPr lang="en-AT" smtClean="0"/>
-              <a:t>05.08.21</a:t>
+              <a:t>06.08.21</a:t>
             </a:fld>
             <a:endParaRPr lang="en-AT"/>
           </a:p>
@@ -1427,7 +1427,7 @@
           <a:p>
             <a:fld id="{5614F2D6-720D-C247-ABDA-43D51A7EF99E}" type="datetimeFigureOut">
               <a:rPr lang="en-AT" smtClean="0"/>
-              <a:t>05.08.21</a:t>
+              <a:t>06.08.21</a:t>
             </a:fld>
             <a:endParaRPr lang="en-AT"/>
           </a:p>
@@ -1842,7 +1842,7 @@
           <a:p>
             <a:fld id="{5614F2D6-720D-C247-ABDA-43D51A7EF99E}" type="datetimeFigureOut">
               <a:rPr lang="en-AT" smtClean="0"/>
-              <a:t>05.08.21</a:t>
+              <a:t>06.08.21</a:t>
             </a:fld>
             <a:endParaRPr lang="en-AT"/>
           </a:p>
@@ -1984,7 +1984,7 @@
           <a:p>
             <a:fld id="{5614F2D6-720D-C247-ABDA-43D51A7EF99E}" type="datetimeFigureOut">
               <a:rPr lang="en-AT" smtClean="0"/>
-              <a:t>05.08.21</a:t>
+              <a:t>06.08.21</a:t>
             </a:fld>
             <a:endParaRPr lang="en-AT"/>
           </a:p>
@@ -2097,7 +2097,7 @@
           <a:p>
             <a:fld id="{5614F2D6-720D-C247-ABDA-43D51A7EF99E}" type="datetimeFigureOut">
               <a:rPr lang="en-AT" smtClean="0"/>
-              <a:t>05.08.21</a:t>
+              <a:t>06.08.21</a:t>
             </a:fld>
             <a:endParaRPr lang="en-AT"/>
           </a:p>
@@ -2410,7 +2410,7 @@
           <a:p>
             <a:fld id="{5614F2D6-720D-C247-ABDA-43D51A7EF99E}" type="datetimeFigureOut">
               <a:rPr lang="en-AT" smtClean="0"/>
-              <a:t>05.08.21</a:t>
+              <a:t>06.08.21</a:t>
             </a:fld>
             <a:endParaRPr lang="en-AT"/>
           </a:p>
@@ -2699,7 +2699,7 @@
           <a:p>
             <a:fld id="{5614F2D6-720D-C247-ABDA-43D51A7EF99E}" type="datetimeFigureOut">
               <a:rPr lang="en-AT" smtClean="0"/>
-              <a:t>05.08.21</a:t>
+              <a:t>06.08.21</a:t>
             </a:fld>
             <a:endParaRPr lang="en-AT"/>
           </a:p>
@@ -2942,7 +2942,7 @@
           <a:p>
             <a:fld id="{5614F2D6-720D-C247-ABDA-43D51A7EF99E}" type="datetimeFigureOut">
               <a:rPr lang="en-AT" smtClean="0"/>
-              <a:t>05.08.21</a:t>
+              <a:t>06.08.21</a:t>
             </a:fld>
             <a:endParaRPr lang="en-AT"/>
           </a:p>
@@ -3380,9 +3380,7 @@
             <a:avLst/>
           </a:prstGeom>
           <a:solidFill>
-            <a:srgbClr val="4472C4">
-              <a:lumMod val="50000"/>
-            </a:srgbClr>
+            <a:srgbClr val="005593"/>
           </a:solidFill>
           <a:ln w="47625" cap="flat" cmpd="sng" algn="ctr">
             <a:noFill/>
@@ -3454,7 +3452,7 @@
           <a:noFill/>
           <a:ln w="31750" cap="flat" cmpd="sng" algn="ctr">
             <a:solidFill>
-              <a:srgbClr val="4472C4"/>
+              <a:srgbClr val="005593"/>
             </a:solidFill>
             <a:prstDash val="solid"/>
             <a:miter lim="800000"/>
@@ -3743,10 +3741,12 @@
             <a:avLst/>
           </a:prstGeom>
           <a:solidFill>
-            <a:srgbClr val="4472C4"/>
+            <a:srgbClr val="005593"/>
           </a:solidFill>
           <a:ln w="12700" cap="flat" cmpd="sng" algn="ctr">
-            <a:noFill/>
+            <a:solidFill>
+              <a:srgbClr val="005593"/>
+            </a:solidFill>
             <a:prstDash val="solid"/>
             <a:miter lim="800000"/>
           </a:ln>
@@ -3829,7 +3829,7 @@
           <a:noFill/>
           <a:ln w="31750" cap="flat" cmpd="sng" algn="ctr">
             <a:solidFill>
-              <a:srgbClr val="4472C4"/>
+              <a:srgbClr val="005593"/>
             </a:solidFill>
             <a:prstDash val="solid"/>
             <a:miter lim="800000"/>
@@ -3852,7 +3852,7 @@
         </p:nvSpPr>
         <p:spPr>
           <a:xfrm>
-            <a:off x="3729224" y="2367233"/>
+            <a:off x="3794537" y="2367233"/>
             <a:ext cx="1114247" cy="646331"/>
           </a:xfrm>
           <a:prstGeom prst="rect">
@@ -3904,10 +3904,12 @@
             <a:avLst/>
           </a:prstGeom>
           <a:solidFill>
-            <a:srgbClr val="4472C4"/>
+            <a:srgbClr val="005593"/>
           </a:solidFill>
           <a:ln w="12700" cap="flat" cmpd="sng" algn="ctr">
-            <a:noFill/>
+            <a:solidFill>
+              <a:srgbClr val="005593"/>
+            </a:solidFill>
             <a:prstDash val="solid"/>
             <a:miter lim="800000"/>
           </a:ln>
@@ -4025,10 +4027,12 @@
             <a:avLst/>
           </a:prstGeom>
           <a:solidFill>
-            <a:srgbClr val="4472C4"/>
+            <a:srgbClr val="005593"/>
           </a:solidFill>
           <a:ln w="12700" cap="flat" cmpd="sng" algn="ctr">
-            <a:noFill/>
+            <a:solidFill>
+              <a:srgbClr val="005593"/>
+            </a:solidFill>
             <a:prstDash val="solid"/>
             <a:miter lim="800000"/>
           </a:ln>
@@ -4105,7 +4109,7 @@
           <a:noFill/>
           <a:ln w="31750" cap="flat" cmpd="sng" algn="ctr">
             <a:solidFill>
-              <a:srgbClr val="4472C4"/>
+              <a:srgbClr val="005593"/>
             </a:solidFill>
             <a:prstDash val="solid"/>
             <a:miter lim="800000"/>
@@ -4180,10 +4184,12 @@
             <a:avLst/>
           </a:prstGeom>
           <a:solidFill>
-            <a:srgbClr val="4472C4"/>
+            <a:srgbClr val="005593"/>
           </a:solidFill>
           <a:ln w="12700" cap="flat" cmpd="sng" algn="ctr">
-            <a:noFill/>
+            <a:solidFill>
+              <a:srgbClr val="005593"/>
+            </a:solidFill>
             <a:prstDash val="solid"/>
             <a:miter lim="800000"/>
           </a:ln>
@@ -4260,7 +4266,7 @@
           <a:noFill/>
           <a:ln w="31750" cap="flat" cmpd="sng" algn="ctr">
             <a:solidFill>
-              <a:srgbClr val="4472C4"/>
+              <a:srgbClr val="005593"/>
             </a:solidFill>
             <a:prstDash val="solid"/>
             <a:miter lim="800000"/>
@@ -4290,9 +4296,7 @@
             <a:avLst/>
           </a:prstGeom>
           <a:solidFill>
-            <a:srgbClr val="4472C4">
-              <a:lumMod val="50000"/>
-            </a:srgbClr>
+            <a:srgbClr val="005593"/>
           </a:solidFill>
           <a:ln w="47625" cap="flat" cmpd="sng" algn="ctr">
             <a:noFill/>

</xml_diff>